<commit_message>
adding new poster and finishing chapter 4
</commit_message>
<xml_diff>
--- a/poster/Poster_Unlinkability.pptx
+++ b/poster/Poster_Unlinkability.pptx
@@ -954,10 +954,16 @@
           <a:p>
             <a:pPr algn="ctr"/>
             <a:r>
+              <a:rPr lang="en-US" sz="4800" dirty="0" err="1">
+                <a:latin typeface="HelveticaNeue LT 45 Light" pitchFamily="34" charset="0"/>
+              </a:rPr>
+              <a:t>Unlinkability</a:t>
+            </a:r>
+            <a:r>
               <a:rPr lang="en-US" sz="4800" dirty="0">
                 <a:latin typeface="HelveticaNeue LT 45 Light" pitchFamily="34" charset="0"/>
               </a:rPr>
-              <a:t>Unlikability of Verifiable Credentials in a practical approach</a:t>
+              <a:t> of Verifiable Credentials in a practical approach</a:t>
             </a:r>
           </a:p>
         </p:txBody>
@@ -1645,7 +1651,7 @@
                 </a:solidFill>
                 <a:latin typeface="Lucida Sans" pitchFamily="34" charset="0"/>
               </a:rPr>
-              <a:t>In today’s world, users have no control over their data. In the physical world users have different credentials, like an ID or a driver’s license. When presented to a verifier, all the data on those credentials are shown, thus disclosing more data than needed. Digitalizing these credentials using different technologies like Verifiable Credentials, the BBS Signature Scheme and Open ID connect, users can secure themselves from oversharing data. This thesis wants to show, that using digital credentials, users can govern over their data, and only reveal what’s necessary.</a:t>
+              <a:t>In today's world, individuals have no control over their data. In the physical world, individuals have different credentials, like an ID or a driver’s license. When presented to a verifier, all the data on those credentials are shown, thus disclosing more data than needed. Digitalizing these credentials using different technologies, like Verifiable Credentials, the BBS Signature Scheme and OpenID Connect, individuals can secure their data. This thesis wants to show, that using digital credentials, individuals can govern over their data and only reveal what’s necessary.</a:t>
             </a:r>
           </a:p>
           <a:p>
@@ -1685,7 +1691,7 @@
                 </a:solidFill>
                 <a:latin typeface="Lucida Sans" pitchFamily="34" charset="0"/>
               </a:rPr>
-              <a:t>Self sovereign identity (SSI) is a concept, where a holder of a data can choose what is revealed to whom. To be able to apply this concept, different technologies are needed. Verifiable Credentials (VC) are a type of digital credentials, which can be verified by the receiving party, called a verifier. The verifiable part of theses credentials are cryptographic signatures. If the verifier trusts the issuer of the credentials, they can verify the validity, integrity and authenticity of the presented content. For the generation of these signatures, the BBS Signature Scheme (BBS) is used in this thesis. In physical credentials there to are different security mechanisms, that allow a</a:t>
+              <a:t>Self sovereign identity (SSI) is a concept, where a holder of a data can choose what is revealed to whom. To be able to apply this concept, different technologies are needed. Verifiable Credentials (VC) are a type of digital credentials, which can be verified by the receiving party, called a verifier. The verifiable part of these credentials are cryptographic signatures. If the verifier trusts the issuer of the credentials, they can verify the validity, integrity and authenticity of the presented content. For the generation of these signatures, the BBS Signature Scheme (BBS) is used in this thesis. In physical credentials there are</a:t>
             </a:r>
           </a:p>
         </p:txBody>
@@ -1698,8 +1704,8 @@
         </p:nvSpPr>
         <p:spPr>
           <a:xfrm>
-            <a:off x="10701037" y="6828414"/>
-            <a:ext cx="8845847" cy="10849124"/>
+            <a:off x="10701037" y="7473890"/>
+            <a:ext cx="8845847" cy="9864239"/>
           </a:xfrm>
           <a:prstGeom prst="rect">
             <a:avLst/>
@@ -1729,13 +1735,13 @@
                 </a:solidFill>
                 <a:latin typeface="Lucida Sans" pitchFamily="34" charset="0"/>
               </a:rPr>
-              <a:t>verifier to check the presented data, like holograms on an ID. On the contrary to physical credentials, where presenting shows the full data, digital credentials signed with BBS allows a user to selectively disclose data. </a:t>
+              <a:t>different security mechanisms, that allow a verifier to check the presented data, like holograms on an ID. While presenting an ID reveals all the data on the credential, digital credentials signed with BBS allow for selective disclosure. Presenting VCs with </a:t>
             </a:r>
             <a:r>
               <a:rPr lang="en-US" altLang="de-DE" sz="3200" dirty="0">
                 <a:latin typeface="Lucida Sans" pitchFamily="34" charset="0"/>
               </a:rPr>
-              <a:t>Bu</a:t>
+              <a:t>a BBS Signature </a:t>
             </a:r>
             <a:r>
               <a:rPr lang="en-US" altLang="de-DE" sz="3200" dirty="0">
@@ -1744,13 +1750,25 @@
                 </a:solidFill>
                 <a:latin typeface="Lucida Sans" pitchFamily="34" charset="0"/>
               </a:rPr>
-              <a:t>t BBS has one more trick up its sleeve, besides the selective disclosure. If one would just reveal the VC with the signature, unlikability</a:t>
+              <a:t>leads to </a:t>
+            </a:r>
+            <a:r>
+              <a:rPr lang="en-US" altLang="de-DE" sz="3200" dirty="0" err="1">
+                <a:solidFill>
+                  <a:schemeClr val="tx1"/>
+                </a:solidFill>
+                <a:latin typeface="Lucida Sans" pitchFamily="34" charset="0"/>
+              </a:rPr>
+              <a:t>linkability</a:t>
             </a:r>
             <a:r>
               <a:rPr lang="en-US" altLang="de-DE" sz="3200" dirty="0">
+                <a:solidFill>
+                  <a:schemeClr val="tx1"/>
+                </a:solidFill>
                 <a:latin typeface="Lucida Sans" pitchFamily="34" charset="0"/>
               </a:rPr>
-              <a:t> would be broken, as the signatures can also be an identificatory. Using BBS, one can generate a proof of knowledge, which proofs to a verifier the knowledge about the original signature. If there is a new proof generated per presentation, no link can be created.</a:t>
+              <a:t> between presentations, as a signature is a unique identifier. This is a big problem for privacy. BBS can create proofs, which are unique for each generation. These proofs demonstrate to a verifier the knowledge of the original signature, without reveling it, thus removing the link.</a:t>
             </a:r>
           </a:p>
           <a:p>
@@ -1786,50 +1804,12 @@
                 </a:solidFill>
                 <a:latin typeface="+mj-lt"/>
               </a:rPr>
-              <a:t>Goals</a:t>
+              <a:t>Goal</a:t>
             </a:r>
+            <a:endParaRPr lang="en-US" altLang="de-DE" sz="3200" dirty="0">
+              <a:latin typeface="Lucida Sans" pitchFamily="34" charset="0"/>
+            </a:endParaRPr>
           </a:p>
-          <a:p>
-            <a:pPr algn="just">
-              <a:spcAft>
-                <a:spcPts val="1200"/>
-              </a:spcAft>
-              <a:buClr>
-                <a:srgbClr val="FAA500"/>
-              </a:buClr>
-              <a:buSzPct val="80000"/>
-              <a:defRPr/>
-            </a:pPr>
-            <a:r>
-              <a:rPr lang="en-US" altLang="de-DE" sz="3200" dirty="0">
-                <a:latin typeface="Lucida Sans" pitchFamily="34" charset="0"/>
-              </a:rPr>
-              <a:t>The Goal of this thesis is to analyze how the different technologies work together. In each step we also analyze if selective disclosure still works, no data leakage</a:t>
-            </a:r>
-          </a:p>
-        </p:txBody>
-      </p:sp>
-      <p:sp>
-        <p:nvSpPr>
-          <p:cNvPr id="18" name="Textfeld 17"/>
-          <p:cNvSpPr txBox="1"/>
-          <p:nvPr/>
-        </p:nvSpPr>
-        <p:spPr>
-          <a:xfrm>
-            <a:off x="20467378" y="1177197"/>
-            <a:ext cx="8845847" cy="12018675"/>
-          </a:xfrm>
-          <a:prstGeom prst="rect">
-            <a:avLst/>
-          </a:prstGeom>
-          <a:noFill/>
-        </p:spPr>
-        <p:txBody>
-          <a:bodyPr wrap="square" rtlCol="0">
-            <a:spAutoFit/>
-          </a:bodyPr>
-          <a:lstStyle/>
           <a:p>
             <a:pPr algn="just">
               <a:spcAft>
@@ -1845,27 +1825,32 @@
               <a:rPr lang="en-US" altLang="de-DE" sz="3200" dirty="0">
                 <a:latin typeface="Lucida Sans" pitchFamily="34" charset="0"/>
               </a:rPr>
-              <a:t>occurs, and if there was no link between the presentations.</a:t>
+              <a:t>The goal is the analysis of the different technologies working together in a real-world use case. </a:t>
             </a:r>
           </a:p>
-          <a:p>
-            <a:pPr algn="just">
-              <a:spcAft>
-                <a:spcPts val="600"/>
-              </a:spcAft>
-              <a:buClr>
-                <a:srgbClr val="FAA500"/>
-              </a:buClr>
-              <a:buSzPct val="80000"/>
-              <a:defRPr/>
-            </a:pPr>
-            <a:endParaRPr lang="en-US" sz="4400" dirty="0">
-              <a:solidFill>
-                <a:srgbClr val="697D91"/>
-              </a:solidFill>
-              <a:latin typeface="+mj-lt"/>
-            </a:endParaRPr>
-          </a:p>
+        </p:txBody>
+      </p:sp>
+      <p:sp>
+        <p:nvSpPr>
+          <p:cNvPr id="18" name="Textfeld 17"/>
+          <p:cNvSpPr txBox="1"/>
+          <p:nvPr/>
+        </p:nvSpPr>
+        <p:spPr>
+          <a:xfrm>
+            <a:off x="20467378" y="1177197"/>
+            <a:ext cx="8845847" cy="8802410"/>
+          </a:xfrm>
+          <a:prstGeom prst="rect">
+            <a:avLst/>
+          </a:prstGeom>
+          <a:noFill/>
+        </p:spPr>
+        <p:txBody>
+          <a:bodyPr wrap="square" rtlCol="0">
+            <a:spAutoFit/>
+          </a:bodyPr>
+          <a:lstStyle/>
           <a:p>
             <a:pPr algn="just">
               <a:spcAft>
@@ -1902,7 +1887,37 @@
               <a:rPr lang="en-US" altLang="de-DE" sz="3200" dirty="0">
                 <a:latin typeface="Lucida Sans" pitchFamily="34" charset="0"/>
               </a:rPr>
-              <a:t>The first step was the unification between BBS and VC. After modifying the VC to be able to input it into BBS and analyzing the results, we found a small data leak, which came from an an algorithm. Randomizing the result of the algorithm using a hash function, solved this issue. The messaging layer Open ID Connect for Verifiable Presentations did not result in any data leakage but had other security concerns. To avoid replay attacks, a nonce was used. There is also the problem of session fixation attacks, which were solved with a redirect, so that the secret for the VP was sent to a different endpoint than the initial one. With those facts, we can say that the creation and transportation of digital credentials is safe allows users to govern over their data.</a:t>
+              <a:t>How to use VCs with BBS was not straight forward, as various problems and security concerns became apparent. But these were all cleared up by different solutions, thus retaining selective disclosure and </a:t>
+            </a:r>
+            <a:r>
+              <a:rPr lang="en-US" altLang="de-DE" sz="3200" dirty="0" err="1">
+                <a:latin typeface="Lucida Sans" pitchFamily="34" charset="0"/>
+              </a:rPr>
+              <a:t>unlinkability</a:t>
+            </a:r>
+            <a:r>
+              <a:rPr lang="en-US" altLang="de-DE" sz="3200" dirty="0">
+                <a:latin typeface="Lucida Sans" pitchFamily="34" charset="0"/>
+              </a:rPr>
+              <a:t>. OpenID Connect for Verifiable Presentations had as well some security concerns, which were also solved.</a:t>
+            </a:r>
+          </a:p>
+          <a:p>
+            <a:pPr algn="just">
+              <a:spcAft>
+                <a:spcPts val="600"/>
+              </a:spcAft>
+              <a:buClr>
+                <a:srgbClr val="FAA500"/>
+              </a:buClr>
+              <a:buSzPct val="80000"/>
+              <a:defRPr/>
+            </a:pPr>
+            <a:r>
+              <a:rPr lang="en-US" altLang="de-DE" sz="3200" dirty="0">
+                <a:latin typeface="Lucida Sans" pitchFamily="34" charset="0"/>
+              </a:rPr>
+              <a:t>Knowing how to generate digital credentials using VCs, protect them using BBS and deliver them trough secure channels using OIDC4VP, shows a future where SSI is possible. Using the mentioned technologies as a basis, future research may contribute to a more secure digital world for individuals.</a:t>
             </a:r>
           </a:p>
         </p:txBody>
@@ -1979,10 +1994,10 @@
       </p:sp>
       <p:pic>
         <p:nvPicPr>
-          <p:cNvPr id="23" name="Picture 22" descr="A black background with white rectangles&#10;&#10;Description automatically generated">
+          <p:cNvPr id="4" name="Picture 3">
             <a:extLst>
               <a:ext uri="{FF2B5EF4-FFF2-40B4-BE49-F238E27FC236}">
-                <a16:creationId xmlns:a16="http://schemas.microsoft.com/office/drawing/2014/main" id="{4B0AFF98-D3C1-5CF6-9C2C-A146B4128926}"/>
+                <a16:creationId xmlns:a16="http://schemas.microsoft.com/office/drawing/2014/main" id="{BF74CD6C-66F2-0F54-7F65-69B194555057}"/>
               </a:ext>
             </a:extLst>
           </p:cNvPr>
@@ -1999,8 +2014,8 @@
         </p:blipFill>
         <p:spPr>
           <a:xfrm>
-            <a:off x="23042044" y="12866960"/>
-            <a:ext cx="6592704" cy="4968415"/>
+            <a:off x="22306934" y="9979607"/>
+            <a:ext cx="7074265" cy="7662647"/>
           </a:xfrm>
           <a:prstGeom prst="rect">
             <a:avLst/>
@@ -2009,10 +2024,10 @@
       </p:pic>
       <p:sp>
         <p:nvSpPr>
-          <p:cNvPr id="24" name="Textfeld 4">
+          <p:cNvPr id="5" name="Textfeld 4">
             <a:extLst>
               <a:ext uri="{FF2B5EF4-FFF2-40B4-BE49-F238E27FC236}">
-                <a16:creationId xmlns:a16="http://schemas.microsoft.com/office/drawing/2014/main" id="{09DC47D3-3213-D524-B6F6-3B237078652E}"/>
+                <a16:creationId xmlns:a16="http://schemas.microsoft.com/office/drawing/2014/main" id="{FA98C451-F318-61DC-A359-9AC5B1974BBB}"/>
               </a:ext>
             </a:extLst>
           </p:cNvPr>
@@ -2021,8 +2036,8 @@
         </p:nvSpPr>
         <p:spPr>
           <a:xfrm>
-            <a:off x="20503301" y="13407358"/>
-            <a:ext cx="2538744" cy="2246769"/>
+            <a:off x="20535353" y="16688147"/>
+            <a:ext cx="1840396" cy="954107"/>
           </a:xfrm>
           <a:prstGeom prst="rect">
             <a:avLst/>
@@ -2042,7 +2057,7 @@
             </a:pPr>
             <a:r>
               <a:rPr lang="en-US" sz="2800" i="1" dirty="0"/>
-              <a:t>Sequence diagram of verification of the name of a user</a:t>
+              <a:t>Example of a VC</a:t>
             </a:r>
           </a:p>
         </p:txBody>
@@ -2321,6 +2336,15 @@
 </file>
 
 <file path=customXml/item1.xml><?xml version="1.0" encoding="utf-8"?>
+<?mso-contentType ?>
+<FormTemplates xmlns="http://schemas.microsoft.com/sharepoint/v3/contenttype/forms">
+  <Display>DocumentLibraryForm</Display>
+  <Edit>DocumentLibraryForm</Edit>
+  <New>DocumentLibraryForm</New>
+</FormTemplates>
+</file>
+
+<file path=customXml/item2.xml><?xml version="1.0" encoding="utf-8"?>
 <ct:contentTypeSchema xmlns:ct="http://schemas.microsoft.com/office/2006/metadata/contentType" xmlns:ma="http://schemas.microsoft.com/office/2006/metadata/properties/metaAttributes" ct:_="" ma:_="" ma:contentTypeName="BFH Document" ma:contentTypeID="0x0101009127C3B567804923A8661E062BBD8EF500562C9D82744B284A86093F1D9B579BDC" ma:contentTypeVersion="2" ma:contentTypeDescription="Ein neues Dokument erstellen." ma:contentTypeScope="" ma:versionID="9c45b5bf27c78835ceac1d8ed0ad849b">
   <xsd:schema xmlns:xsd="http://www.w3.org/2001/XMLSchema" xmlns:xs="http://www.w3.org/2001/XMLSchema" xmlns:p="http://schemas.microsoft.com/office/2006/metadata/properties" xmlns:ns2="63c724b1-652e-424f-8d99-4ee509067280" xmlns:ns3="2551ef7e-3b29-44d1-a8ad-ef34c26bfc60" targetNamespace="http://schemas.microsoft.com/office/2006/metadata/properties" ma:root="true" ma:fieldsID="77ddedd9f4909d73cfb737d3d691d0f9" ns2:_="" ns3:_="">
     <xsd:import namespace="63c724b1-652e-424f-8d99-4ee509067280"/>
@@ -2465,16 +2489,11 @@
 </ct:contentTypeSchema>
 </file>
 
-<file path=customXml/item2.xml><?xml version="1.0" encoding="utf-8"?>
-<?mso-contentType ?>
-<FormTemplates xmlns="http://schemas.microsoft.com/sharepoint/v3/contenttype/forms">
-  <Display>DocumentLibraryForm</Display>
-  <Edit>DocumentLibraryForm</Edit>
-  <New>DocumentLibraryForm</New>
-</FormTemplates>
+<file path=customXml/item3.xml><?xml version="1.0" encoding="utf-8"?>
+<LongProperties xmlns="http://schemas.microsoft.com/office/2006/metadata/longProperties"/>
 </file>
 
-<file path=customXml/item3.xml><?xml version="1.0" encoding="utf-8"?>
+<file path=customXml/item4.xml><?xml version="1.0" encoding="utf-8"?>
 <p:properties xmlns:p="http://schemas.microsoft.com/office/2006/metadata/properties" xmlns:xsi="http://www.w3.org/2001/XMLSchema-instance" xmlns:pc="http://schemas.microsoft.com/office/infopath/2007/PartnerControls">
   <documentManagement>
     <BfhIntranetDepartmentText xmlns="63c724b1-652e-424f-8d99-4ee509067280">
@@ -2492,11 +2511,15 @@
 </p:properties>
 </file>
 
-<file path=customXml/item4.xml><?xml version="1.0" encoding="utf-8"?>
-<LongProperties xmlns="http://schemas.microsoft.com/office/2006/metadata/longProperties"/>
+<file path=customXml/itemProps1.xml><?xml version="1.0" encoding="utf-8"?>
+<ds:datastoreItem xmlns:ds="http://schemas.openxmlformats.org/officeDocument/2006/customXml" ds:itemID="{47870AFC-B140-4E73-B0E2-054A74E7EB25}">
+  <ds:schemaRefs>
+    <ds:schemaRef ds:uri="http://schemas.microsoft.com/sharepoint/v3/contenttype/forms"/>
+  </ds:schemaRefs>
+</ds:datastoreItem>
 </file>
 
-<file path=customXml/itemProps1.xml><?xml version="1.0" encoding="utf-8"?>
+<file path=customXml/itemProps2.xml><?xml version="1.0" encoding="utf-8"?>
 <ds:datastoreItem xmlns:ds="http://schemas.openxmlformats.org/officeDocument/2006/customXml" ds:itemID="{064F56C1-3E03-4158-81FF-45AFD11405FB}">
   <ds:schemaRefs>
     <ds:schemaRef ds:uri="http://schemas.microsoft.com/office/2006/metadata/contentType"/>
@@ -2515,15 +2538,15 @@
 </ds:datastoreItem>
 </file>
 
-<file path=customXml/itemProps2.xml><?xml version="1.0" encoding="utf-8"?>
-<ds:datastoreItem xmlns:ds="http://schemas.openxmlformats.org/officeDocument/2006/customXml" ds:itemID="{47870AFC-B140-4E73-B0E2-054A74E7EB25}">
+<file path=customXml/itemProps3.xml><?xml version="1.0" encoding="utf-8"?>
+<ds:datastoreItem xmlns:ds="http://schemas.openxmlformats.org/officeDocument/2006/customXml" ds:itemID="{34ACECAE-8DDC-4218-ADDE-80828E100BF5}">
   <ds:schemaRefs>
-    <ds:schemaRef ds:uri="http://schemas.microsoft.com/sharepoint/v3/contenttype/forms"/>
+    <ds:schemaRef ds:uri="http://schemas.microsoft.com/office/2006/metadata/longProperties"/>
   </ds:schemaRefs>
 </ds:datastoreItem>
 </file>
 
-<file path=customXml/itemProps3.xml><?xml version="1.0" encoding="utf-8"?>
+<file path=customXml/itemProps4.xml><?xml version="1.0" encoding="utf-8"?>
 <ds:datastoreItem xmlns:ds="http://schemas.openxmlformats.org/officeDocument/2006/customXml" ds:itemID="{12310AE4-98C2-4A3E-BE75-5A8AB8823A32}">
   <ds:schemaRefs>
     <ds:schemaRef ds:uri="2551ef7e-3b29-44d1-a8ad-ef34c26bfc60"/>
@@ -2538,12 +2561,4 @@
     <ds:schemaRef ds:uri="http://schemas.openxmlformats.org/package/2006/metadata/core-properties"/>
   </ds:schemaRefs>
 </ds:datastoreItem>
-</file>
-
-<file path=customXml/itemProps4.xml><?xml version="1.0" encoding="utf-8"?>
-<ds:datastoreItem xmlns:ds="http://schemas.openxmlformats.org/officeDocument/2006/customXml" ds:itemID="{34ACECAE-8DDC-4218-ADDE-80828E100BF5}">
-  <ds:schemaRefs>
-    <ds:schemaRef ds:uri="http://schemas.microsoft.com/office/2006/metadata/longProperties"/>
-  </ds:schemaRefs>
-</ds:datastoreItem>
 </file>
</xml_diff>

<commit_message>
Adding new security risk
</commit_message>
<xml_diff>
--- a/poster/Poster_Unlinkability.pptx
+++ b/poster/Poster_Unlinkability.pptx
@@ -1601,7 +1601,7 @@
         <p:spPr>
           <a:xfrm>
             <a:off x="898776" y="875400"/>
-            <a:ext cx="8845847" cy="17358598"/>
+            <a:ext cx="8845847" cy="16866156"/>
           </a:xfrm>
           <a:prstGeom prst="rect">
             <a:avLst/>
@@ -1637,7 +1637,7 @@
             </a:pPr>
             <a:r>
               <a:rPr lang="en-US" altLang="de-DE" dirty="0"/>
-              <a:t>Summary</a:t>
+              <a:t>Introduction</a:t>
             </a:r>
           </a:p>
           <a:p>
@@ -1674,7 +1674,7 @@
             </a:pPr>
             <a:r>
               <a:rPr lang="en-US" altLang="de-DE" sz="4400" dirty="0"/>
-              <a:t>Introduction</a:t>
+              <a:t>SSI and VCs</a:t>
             </a:r>
           </a:p>
           <a:p>
@@ -1691,7 +1691,79 @@
                 </a:solidFill>
                 <a:latin typeface="Lucida Sans" pitchFamily="34" charset="0"/>
               </a:rPr>
-              <a:t>Self sovereign identity (SSI) is a concept, where a holder of a data can choose what is revealed to whom. To be able to apply this concept, different technologies are needed. Verifiable Credentials (VC) are a type of digital credentials, which can be verified by the receiving party, called a verifier. The verifiable part of these credentials are cryptographic signatures. If the verifier trusts the issuer of the credentials, they can verify the validity, integrity and authenticity of the presented content. For the generation of these signatures, the BBS Signature Scheme (BBS) is used in this thesis. In physical credentials there are</a:t>
+              <a:t>Self sovereign identity (SSI) is a concept, where a holder of a data can choose what is revealed to whom. To be able to apply this concept, different technologies are needed. Verifiable Credentials (VC) are a type of digital credentials, which can be verified by the receiving party, called a verifier. The verifiable part of these credentials are cryptographic signatures. If the verifier trusts the issuer of the credentials, they can verify the validity, integrity and authenticity of the presented content. For the generation of these signatures, the BBS Signature Scheme, created by Dan </a:t>
+            </a:r>
+            <a:r>
+              <a:rPr lang="en-US" altLang="de-DE" sz="3200" dirty="0" err="1">
+                <a:solidFill>
+                  <a:schemeClr val="tx1"/>
+                </a:solidFill>
+                <a:latin typeface="Lucida Sans" pitchFamily="34" charset="0"/>
+              </a:rPr>
+              <a:t>Boneh</a:t>
+            </a:r>
+            <a:r>
+              <a:rPr lang="en-US" altLang="de-DE" sz="3200" dirty="0">
+                <a:solidFill>
+                  <a:schemeClr val="tx1"/>
+                </a:solidFill>
+                <a:latin typeface="Lucida Sans" pitchFamily="34" charset="0"/>
+              </a:rPr>
+              <a:t>, Xavier </a:t>
+            </a:r>
+            <a:r>
+              <a:rPr lang="en-US" altLang="de-DE" sz="3200" dirty="0" err="1">
+                <a:solidFill>
+                  <a:schemeClr val="tx1"/>
+                </a:solidFill>
+                <a:latin typeface="Lucida Sans" pitchFamily="34" charset="0"/>
+              </a:rPr>
+              <a:t>Boyen</a:t>
+            </a:r>
+            <a:r>
+              <a:rPr lang="en-US" altLang="de-DE" sz="3200" dirty="0">
+                <a:solidFill>
+                  <a:schemeClr val="tx1"/>
+                </a:solidFill>
+                <a:latin typeface="Lucida Sans" pitchFamily="34" charset="0"/>
+              </a:rPr>
+              <a:t>, and </a:t>
+            </a:r>
+            <a:r>
+              <a:rPr lang="en-US" altLang="de-DE" sz="3200" dirty="0" err="1">
+                <a:solidFill>
+                  <a:schemeClr val="tx1"/>
+                </a:solidFill>
+                <a:latin typeface="Lucida Sans" pitchFamily="34" charset="0"/>
+              </a:rPr>
+              <a:t>Hovav</a:t>
+            </a:r>
+            <a:r>
+              <a:rPr lang="en-US" altLang="de-DE" sz="3200" dirty="0">
+                <a:solidFill>
+                  <a:schemeClr val="tx1"/>
+                </a:solidFill>
+                <a:latin typeface="Lucida Sans" pitchFamily="34" charset="0"/>
+              </a:rPr>
+              <a:t> </a:t>
+            </a:r>
+            <a:r>
+              <a:rPr lang="en-US" altLang="de-DE" sz="3200" dirty="0" err="1">
+                <a:solidFill>
+                  <a:schemeClr val="tx1"/>
+                </a:solidFill>
+                <a:latin typeface="Lucida Sans" pitchFamily="34" charset="0"/>
+              </a:rPr>
+              <a:t>Shacham</a:t>
+            </a:r>
+            <a:r>
+              <a:rPr lang="en-US" altLang="de-DE" sz="3200" dirty="0">
+                <a:solidFill>
+                  <a:schemeClr val="tx1"/>
+                </a:solidFill>
+                <a:latin typeface="Lucida Sans" pitchFamily="34" charset="0"/>
+              </a:rPr>
+              <a:t> (BBS) is</a:t>
             </a:r>
           </a:p>
         </p:txBody>
@@ -1704,8 +1776,8 @@
         </p:nvSpPr>
         <p:spPr>
           <a:xfrm>
-            <a:off x="10701037" y="7473890"/>
-            <a:ext cx="8845847" cy="9864239"/>
+            <a:off x="10701037" y="6482980"/>
+            <a:ext cx="8845847" cy="11341566"/>
           </a:xfrm>
           <a:prstGeom prst="rect">
             <a:avLst/>
@@ -1735,7 +1807,7 @@
                 </a:solidFill>
                 <a:latin typeface="Lucida Sans" pitchFamily="34" charset="0"/>
               </a:rPr>
-              <a:t>different security mechanisms, that allow a verifier to check the presented data, like holograms on an ID. While presenting an ID reveals all the data on the credential, digital credentials signed with BBS allow for selective disclosure. Presenting VCs with </a:t>
+              <a:t>used in this thesis. In physical credentials there are different security mechanisms, that allow a verifier to check the presented data, like holograms on an ID. While presenting an ID reveals all the data on the credential, digital credentials signed with BBS allow for selective disclosure. Presenting VCs with </a:t>
             </a:r>
             <a:r>
               <a:rPr lang="en-US" altLang="de-DE" sz="3200" dirty="0">
@@ -1825,7 +1897,19 @@
               <a:rPr lang="en-US" altLang="de-DE" sz="3200" dirty="0">
                 <a:latin typeface="Lucida Sans" pitchFamily="34" charset="0"/>
               </a:rPr>
-              <a:t>The goal is the analysis of the different technologies working together in a real-world use case. </a:t>
+              <a:t>The goal of this thesis is to analyze if using these different technologies together in a real-world use case, breaks the </a:t>
+            </a:r>
+            <a:r>
+              <a:rPr lang="en-US" altLang="de-DE" sz="3200" dirty="0" err="1">
+                <a:latin typeface="Lucida Sans" pitchFamily="34" charset="0"/>
+              </a:rPr>
+              <a:t>unlinkabilty</a:t>
+            </a:r>
+            <a:r>
+              <a:rPr lang="en-US" altLang="de-DE" sz="3200" dirty="0">
+                <a:latin typeface="Lucida Sans" pitchFamily="34" charset="0"/>
+              </a:rPr>
+              <a:t> provided by BBS.</a:t>
             </a:r>
           </a:p>
         </p:txBody>
@@ -1839,7 +1923,7 @@
         <p:spPr>
           <a:xfrm>
             <a:off x="20467378" y="1177197"/>
-            <a:ext cx="8845847" cy="8802410"/>
+            <a:ext cx="8845847" cy="7817525"/>
           </a:xfrm>
           <a:prstGeom prst="rect">
             <a:avLst/>
@@ -1917,7 +2001,7 @@
               <a:rPr lang="en-US" altLang="de-DE" sz="3200" dirty="0">
                 <a:latin typeface="Lucida Sans" pitchFamily="34" charset="0"/>
               </a:rPr>
-              <a:t>Knowing how to generate digital credentials using VCs, protect them using BBS and deliver them trough secure channels using OIDC4VP, shows a future where SSI is possible. Using the mentioned technologies as a basis, future research may contribute to a more secure digital world for individuals.</a:t>
+              <a:t>The results of this thesis show, that using these technologies together, a future where SSI is the standard, is possible. Using the mentioned technologies as a basis, future research may contribute to a more secure digital world for individuals.</a:t>
             </a:r>
           </a:p>
         </p:txBody>
@@ -1944,8 +2028,8 @@
         </p:blipFill>
         <p:spPr>
           <a:xfrm>
-            <a:off x="10633065" y="1271139"/>
-            <a:ext cx="8877899" cy="5073085"/>
+            <a:off x="11095507" y="1271139"/>
+            <a:ext cx="8088960" cy="4622263"/>
           </a:xfrm>
           <a:prstGeom prst="rect">
             <a:avLst/>
@@ -1966,7 +2050,7 @@
         </p:nvSpPr>
         <p:spPr>
           <a:xfrm>
-            <a:off x="10701037" y="6344224"/>
+            <a:off x="11027534" y="5926581"/>
             <a:ext cx="8877899" cy="523220"/>
           </a:xfrm>
           <a:prstGeom prst="rect">
@@ -2014,8 +2098,8 @@
         </p:blipFill>
         <p:spPr>
           <a:xfrm>
-            <a:off x="22306934" y="9979607"/>
-            <a:ext cx="7074265" cy="7662647"/>
+            <a:off x="21116350" y="9044043"/>
+            <a:ext cx="7547902" cy="8175677"/>
           </a:xfrm>
           <a:prstGeom prst="rect">
             <a:avLst/>
@@ -2036,8 +2120,8 @@
         </p:nvSpPr>
         <p:spPr>
           <a:xfrm>
-            <a:off x="20535353" y="16688147"/>
-            <a:ext cx="1840396" cy="954107"/>
+            <a:off x="21116350" y="17306145"/>
+            <a:ext cx="6642647" cy="523220"/>
           </a:xfrm>
           <a:prstGeom prst="rect">
             <a:avLst/>
@@ -2336,15 +2420,28 @@
 </file>
 
 <file path=customXml/item1.xml><?xml version="1.0" encoding="utf-8"?>
-<?mso-contentType ?>
-<FormTemplates xmlns="http://schemas.microsoft.com/sharepoint/v3/contenttype/forms">
-  <Display>DocumentLibraryForm</Display>
-  <Edit>DocumentLibraryForm</Edit>
-  <New>DocumentLibraryForm</New>
-</FormTemplates>
+<p:properties xmlns:p="http://schemas.microsoft.com/office/2006/metadata/properties" xmlns:xsi="http://www.w3.org/2001/XMLSchema-instance" xmlns:pc="http://schemas.microsoft.com/office/infopath/2007/PartnerControls">
+  <documentManagement>
+    <BfhIntranetDepartmentText xmlns="63c724b1-652e-424f-8d99-4ee509067280">
+      <Terms xmlns="http://schemas.microsoft.com/office/infopath/2007/PartnerControls">
+        <TermInfo xmlns="http://schemas.microsoft.com/office/infopath/2007/PartnerControls">
+          <TermName xmlns="http://schemas.microsoft.com/office/infopath/2007/PartnerControls">Vorlage</TermName>
+          <TermId xmlns="http://schemas.microsoft.com/office/infopath/2007/PartnerControls">de1a6d3c-ac6a-4b34-8edd-308eb81066db</TermId>
+        </TermInfo>
+      </Terms>
+    </BfhIntranetDepartmentText>
+    <TaxCatchAll xmlns="2551ef7e-3b29-44d1-a8ad-ef34c26bfc60">
+      <Value>241</Value>
+    </TaxCatchAll>
+  </documentManagement>
+</p:properties>
 </file>
 
 <file path=customXml/item2.xml><?xml version="1.0" encoding="utf-8"?>
+<LongProperties xmlns="http://schemas.microsoft.com/office/2006/metadata/longProperties"/>
+</file>
+
+<file path=customXml/item3.xml><?xml version="1.0" encoding="utf-8"?>
 <ct:contentTypeSchema xmlns:ct="http://schemas.microsoft.com/office/2006/metadata/contentType" xmlns:ma="http://schemas.microsoft.com/office/2006/metadata/properties/metaAttributes" ct:_="" ma:_="" ma:contentTypeName="BFH Document" ma:contentTypeID="0x0101009127C3B567804923A8661E062BBD8EF500562C9D82744B284A86093F1D9B579BDC" ma:contentTypeVersion="2" ma:contentTypeDescription="Ein neues Dokument erstellen." ma:contentTypeScope="" ma:versionID="9c45b5bf27c78835ceac1d8ed0ad849b">
   <xsd:schema xmlns:xsd="http://www.w3.org/2001/XMLSchema" xmlns:xs="http://www.w3.org/2001/XMLSchema" xmlns:p="http://schemas.microsoft.com/office/2006/metadata/properties" xmlns:ns2="63c724b1-652e-424f-8d99-4ee509067280" xmlns:ns3="2551ef7e-3b29-44d1-a8ad-ef34c26bfc60" targetNamespace="http://schemas.microsoft.com/office/2006/metadata/properties" ma:root="true" ma:fieldsID="77ddedd9f4909d73cfb737d3d691d0f9" ns2:_="" ns3:_="">
     <xsd:import namespace="63c724b1-652e-424f-8d99-4ee509067280"/>
@@ -2489,37 +2586,41 @@
 </ct:contentTypeSchema>
 </file>
 
-<file path=customXml/item3.xml><?xml version="1.0" encoding="utf-8"?>
-<LongProperties xmlns="http://schemas.microsoft.com/office/2006/metadata/longProperties"/>
-</file>
-
 <file path=customXml/item4.xml><?xml version="1.0" encoding="utf-8"?>
-<p:properties xmlns:p="http://schemas.microsoft.com/office/2006/metadata/properties" xmlns:xsi="http://www.w3.org/2001/XMLSchema-instance" xmlns:pc="http://schemas.microsoft.com/office/infopath/2007/PartnerControls">
-  <documentManagement>
-    <BfhIntranetDepartmentText xmlns="63c724b1-652e-424f-8d99-4ee509067280">
-      <Terms xmlns="http://schemas.microsoft.com/office/infopath/2007/PartnerControls">
-        <TermInfo xmlns="http://schemas.microsoft.com/office/infopath/2007/PartnerControls">
-          <TermName xmlns="http://schemas.microsoft.com/office/infopath/2007/PartnerControls">Vorlage</TermName>
-          <TermId xmlns="http://schemas.microsoft.com/office/infopath/2007/PartnerControls">de1a6d3c-ac6a-4b34-8edd-308eb81066db</TermId>
-        </TermInfo>
-      </Terms>
-    </BfhIntranetDepartmentText>
-    <TaxCatchAll xmlns="2551ef7e-3b29-44d1-a8ad-ef34c26bfc60">
-      <Value>241</Value>
-    </TaxCatchAll>
-  </documentManagement>
-</p:properties>
+<?mso-contentType ?>
+<FormTemplates xmlns="http://schemas.microsoft.com/sharepoint/v3/contenttype/forms">
+  <Display>DocumentLibraryForm</Display>
+  <Edit>DocumentLibraryForm</Edit>
+  <New>DocumentLibraryForm</New>
+</FormTemplates>
 </file>
 
 <file path=customXml/itemProps1.xml><?xml version="1.0" encoding="utf-8"?>
-<ds:datastoreItem xmlns:ds="http://schemas.openxmlformats.org/officeDocument/2006/customXml" ds:itemID="{47870AFC-B140-4E73-B0E2-054A74E7EB25}">
+<ds:datastoreItem xmlns:ds="http://schemas.openxmlformats.org/officeDocument/2006/customXml" ds:itemID="{12310AE4-98C2-4A3E-BE75-5A8AB8823A32}">
   <ds:schemaRefs>
-    <ds:schemaRef ds:uri="http://schemas.microsoft.com/sharepoint/v3/contenttype/forms"/>
+    <ds:schemaRef ds:uri="2551ef7e-3b29-44d1-a8ad-ef34c26bfc60"/>
+    <ds:schemaRef ds:uri="http://schemas.microsoft.com/office/2006/documentManagement/types"/>
+    <ds:schemaRef ds:uri="63c724b1-652e-424f-8d99-4ee509067280"/>
+    <ds:schemaRef ds:uri="http://purl.org/dc/elements/1.1/"/>
+    <ds:schemaRef ds:uri="http://www.w3.org/XML/1998/namespace"/>
+    <ds:schemaRef ds:uri="http://purl.org/dc/terms/"/>
+    <ds:schemaRef ds:uri="http://purl.org/dc/dcmitype/"/>
+    <ds:schemaRef ds:uri="http://schemas.microsoft.com/office/2006/metadata/properties"/>
+    <ds:schemaRef ds:uri="http://schemas.microsoft.com/office/infopath/2007/PartnerControls"/>
+    <ds:schemaRef ds:uri="http://schemas.openxmlformats.org/package/2006/metadata/core-properties"/>
   </ds:schemaRefs>
 </ds:datastoreItem>
 </file>
 
 <file path=customXml/itemProps2.xml><?xml version="1.0" encoding="utf-8"?>
+<ds:datastoreItem xmlns:ds="http://schemas.openxmlformats.org/officeDocument/2006/customXml" ds:itemID="{34ACECAE-8DDC-4218-ADDE-80828E100BF5}">
+  <ds:schemaRefs>
+    <ds:schemaRef ds:uri="http://schemas.microsoft.com/office/2006/metadata/longProperties"/>
+  </ds:schemaRefs>
+</ds:datastoreItem>
+</file>
+
+<file path=customXml/itemProps3.xml><?xml version="1.0" encoding="utf-8"?>
 <ds:datastoreItem xmlns:ds="http://schemas.openxmlformats.org/officeDocument/2006/customXml" ds:itemID="{064F56C1-3E03-4158-81FF-45AFD11405FB}">
   <ds:schemaRefs>
     <ds:schemaRef ds:uri="http://schemas.microsoft.com/office/2006/metadata/contentType"/>
@@ -2538,27 +2639,10 @@
 </ds:datastoreItem>
 </file>
 
-<file path=customXml/itemProps3.xml><?xml version="1.0" encoding="utf-8"?>
-<ds:datastoreItem xmlns:ds="http://schemas.openxmlformats.org/officeDocument/2006/customXml" ds:itemID="{34ACECAE-8DDC-4218-ADDE-80828E100BF5}">
+<file path=customXml/itemProps4.xml><?xml version="1.0" encoding="utf-8"?>
+<ds:datastoreItem xmlns:ds="http://schemas.openxmlformats.org/officeDocument/2006/customXml" ds:itemID="{47870AFC-B140-4E73-B0E2-054A74E7EB25}">
   <ds:schemaRefs>
-    <ds:schemaRef ds:uri="http://schemas.microsoft.com/office/2006/metadata/longProperties"/>
-  </ds:schemaRefs>
-</ds:datastoreItem>
-</file>
-
-<file path=customXml/itemProps4.xml><?xml version="1.0" encoding="utf-8"?>
-<ds:datastoreItem xmlns:ds="http://schemas.openxmlformats.org/officeDocument/2006/customXml" ds:itemID="{12310AE4-98C2-4A3E-BE75-5A8AB8823A32}">
-  <ds:schemaRefs>
-    <ds:schemaRef ds:uri="2551ef7e-3b29-44d1-a8ad-ef34c26bfc60"/>
-    <ds:schemaRef ds:uri="http://schemas.microsoft.com/office/2006/documentManagement/types"/>
-    <ds:schemaRef ds:uri="63c724b1-652e-424f-8d99-4ee509067280"/>
-    <ds:schemaRef ds:uri="http://purl.org/dc/elements/1.1/"/>
-    <ds:schemaRef ds:uri="http://www.w3.org/XML/1998/namespace"/>
-    <ds:schemaRef ds:uri="http://purl.org/dc/terms/"/>
-    <ds:schemaRef ds:uri="http://purl.org/dc/dcmitype/"/>
-    <ds:schemaRef ds:uri="http://schemas.microsoft.com/office/2006/metadata/properties"/>
-    <ds:schemaRef ds:uri="http://schemas.microsoft.com/office/infopath/2007/PartnerControls"/>
-    <ds:schemaRef ds:uri="http://schemas.openxmlformats.org/package/2006/metadata/core-properties"/>
+    <ds:schemaRef ds:uri="http://schemas.microsoft.com/sharepoint/v3/contenttype/forms"/>
   </ds:schemaRefs>
 </ds:datastoreItem>
 </file>
</xml_diff>